<commit_message>
Commit to get function map up to date with master
Commit for functionMap.pptx
</commit_message>
<xml_diff>
--- a/functionMap.pptx
+++ b/functionMap.pptx
@@ -3394,11 +3394,7 @@
           </a:p>
           <a:p>
             <a:r>
-              <a:rPr lang="en-US" dirty="0" smtClean="0"/>
-              <a:t> </a:t>
-            </a:r>
-            <a:r>
-              <a:rPr lang="en-US" dirty="0" err="1" smtClean="0"/>
+              <a:rPr lang="en-US" smtClean="0"/>
               <a:t>newYarnSuccess</a:t>
             </a:r>
             <a:r>

</xml_diff>